<commit_message>
fix: Implement code review suggestions
Bugfix
</commit_message>
<xml_diff>
--- a/starter/DevSecOpsPipeline.pptx
+++ b/starter/DevSecOpsPipeline.pptx
@@ -5897,6 +5897,21 @@
               <a:rPr lang="en" sz="1000" dirty="0"/>
               <a:t>Container Image Scanning</a:t>
             </a:r>
+          </a:p>
+          <a:p>
+            <a:pPr marL="0" lvl="0" indent="0" algn="ctr" rtl="0">
+              <a:spcBef>
+                <a:spcPts val="0"/>
+              </a:spcBef>
+              <a:spcAft>
+                <a:spcPts val="0"/>
+              </a:spcAft>
+              <a:buNone/>
+            </a:pPr>
+            <a:r>
+              <a:rPr lang="en" sz="1000" dirty="0"/>
+              <a:t>e.g. Amazon ECR</a:t>
+            </a:r>
             <a:endParaRPr sz="1000" dirty="0"/>
           </a:p>
         </p:txBody>
@@ -5982,6 +5997,25 @@
             <a:r>
               <a:rPr lang="en" sz="1000" dirty="0"/>
               <a:t>Infrastructure as Code Scanning</a:t>
+            </a:r>
+          </a:p>
+          <a:p>
+            <a:pPr marL="0" lvl="0" indent="0" algn="ctr" rtl="0">
+              <a:spcBef>
+                <a:spcPts val="0"/>
+              </a:spcBef>
+              <a:spcAft>
+                <a:spcPts val="0"/>
+              </a:spcAft>
+              <a:buNone/>
+            </a:pPr>
+            <a:r>
+              <a:rPr lang="en" sz="1000" dirty="0"/>
+              <a:t>e.g. </a:t>
+            </a:r>
+            <a:r>
+              <a:rPr lang="en" sz="1000" dirty="0" err="1"/>
+              <a:t>Checkov</a:t>
             </a:r>
             <a:endParaRPr sz="1000" dirty="0"/>
           </a:p>
@@ -6157,6 +6191,25 @@
             <a:r>
               <a:rPr lang="en" sz="1000" dirty="0"/>
               <a:t>Post-deployment compliance scanning</a:t>
+            </a:r>
+          </a:p>
+          <a:p>
+            <a:pPr marL="0" lvl="0" indent="0" algn="ctr" rtl="0">
+              <a:spcBef>
+                <a:spcPts val="0"/>
+              </a:spcBef>
+              <a:spcAft>
+                <a:spcPts val="0"/>
+              </a:spcAft>
+              <a:buNone/>
+            </a:pPr>
+            <a:r>
+              <a:rPr lang="en" sz="1000" dirty="0"/>
+              <a:t>e.g. </a:t>
+            </a:r>
+            <a:r>
+              <a:rPr lang="en" sz="1000"/>
+              <a:t>Amazon Inspector</a:t>
             </a:r>
             <a:endParaRPr sz="1000" dirty="0"/>
           </a:p>

</xml_diff>